<commit_message>
new course intro, no pdf of first slide deck.
</commit_message>
<xml_diff>
--- a/slides/01-CourseIntroduction.pptx
+++ b/slides/01-CourseIntroduction.pptx
@@ -7,19 +7,20 @@
   <p:sldIdLst>
     <p:sldId id="256" r:id="rId2"/>
     <p:sldId id="257" r:id="rId3"/>
-    <p:sldId id="258" r:id="rId4"/>
-    <p:sldId id="259" r:id="rId5"/>
-    <p:sldId id="260" r:id="rId6"/>
-    <p:sldId id="261" r:id="rId7"/>
-    <p:sldId id="262" r:id="rId8"/>
-    <p:sldId id="263" r:id="rId9"/>
-    <p:sldId id="264" r:id="rId10"/>
-    <p:sldId id="265" r:id="rId11"/>
-    <p:sldId id="272" r:id="rId12"/>
-    <p:sldId id="266" r:id="rId13"/>
-    <p:sldId id="267" r:id="rId14"/>
-    <p:sldId id="268" r:id="rId15"/>
-    <p:sldId id="269" r:id="rId16"/>
+    <p:sldId id="273" r:id="rId4"/>
+    <p:sldId id="258" r:id="rId5"/>
+    <p:sldId id="259" r:id="rId6"/>
+    <p:sldId id="260" r:id="rId7"/>
+    <p:sldId id="261" r:id="rId8"/>
+    <p:sldId id="262" r:id="rId9"/>
+    <p:sldId id="274" r:id="rId10"/>
+    <p:sldId id="263" r:id="rId11"/>
+    <p:sldId id="264" r:id="rId12"/>
+    <p:sldId id="265" r:id="rId13"/>
+    <p:sldId id="272" r:id="rId14"/>
+    <p:sldId id="266" r:id="rId15"/>
+    <p:sldId id="267" r:id="rId16"/>
+    <p:sldId id="269" r:id="rId17"/>
   </p:sldIdLst>
   <p:sldSz cx="12192000" cy="6858000"/>
   <p:notesSz cx="6858000" cy="9144000"/>
@@ -311,7 +312,7 @@
           <a:p>
             <a:fld id="{EE6CD189-E039-4A51-BC88-4927E4923AA0}" type="datetimeFigureOut">
               <a:rPr lang="en-US" smtClean="0"/>
-              <a:t>6/13/2016</a:t>
+              <a:t>1/29/21</a:t>
             </a:fld>
             <a:endParaRPr lang="en-US"/>
           </a:p>
@@ -609,7 +610,7 @@
           <a:p>
             <a:fld id="{EE6CD189-E039-4A51-BC88-4927E4923AA0}" type="datetimeFigureOut">
               <a:rPr lang="en-US" smtClean="0"/>
-              <a:t>6/13/2016</a:t>
+              <a:t>1/29/21</a:t>
             </a:fld>
             <a:endParaRPr lang="en-US"/>
           </a:p>
@@ -801,7 +802,7 @@
           <a:p>
             <a:fld id="{EE6CD189-E039-4A51-BC88-4927E4923AA0}" type="datetimeFigureOut">
               <a:rPr lang="en-US" smtClean="0"/>
-              <a:t>6/13/2016</a:t>
+              <a:t>1/29/21</a:t>
             </a:fld>
             <a:endParaRPr lang="en-US"/>
           </a:p>
@@ -1062,7 +1063,7 @@
           <a:p>
             <a:fld id="{EE6CD189-E039-4A51-BC88-4927E4923AA0}" type="datetimeFigureOut">
               <a:rPr lang="en-US" smtClean="0"/>
-              <a:t>6/13/2016</a:t>
+              <a:t>1/29/21</a:t>
             </a:fld>
             <a:endParaRPr lang="en-US"/>
           </a:p>
@@ -1486,7 +1487,7 @@
           <a:p>
             <a:fld id="{EE6CD189-E039-4A51-BC88-4927E4923AA0}" type="datetimeFigureOut">
               <a:rPr lang="en-US" smtClean="0"/>
-              <a:t>6/13/2016</a:t>
+              <a:t>1/29/21</a:t>
             </a:fld>
             <a:endParaRPr lang="en-US"/>
           </a:p>
@@ -2023,7 +2024,7 @@
           <a:p>
             <a:fld id="{EE6CD189-E039-4A51-BC88-4927E4923AA0}" type="datetimeFigureOut">
               <a:rPr lang="en-US" smtClean="0"/>
-              <a:t>6/13/2016</a:t>
+              <a:t>1/29/21</a:t>
             </a:fld>
             <a:endParaRPr lang="en-US"/>
           </a:p>
@@ -2887,7 +2888,7 @@
           <a:p>
             <a:fld id="{EE6CD189-E039-4A51-BC88-4927E4923AA0}" type="datetimeFigureOut">
               <a:rPr lang="en-US" smtClean="0"/>
-              <a:t>6/13/2016</a:t>
+              <a:t>1/29/21</a:t>
             </a:fld>
             <a:endParaRPr lang="en-US"/>
           </a:p>
@@ -3057,7 +3058,7 @@
           <a:p>
             <a:fld id="{EE6CD189-E039-4A51-BC88-4927E4923AA0}" type="datetimeFigureOut">
               <a:rPr lang="en-US" smtClean="0"/>
-              <a:t>6/13/2016</a:t>
+              <a:t>1/29/21</a:t>
             </a:fld>
             <a:endParaRPr lang="en-US"/>
           </a:p>
@@ -3241,7 +3242,7 @@
           <a:p>
             <a:fld id="{EE6CD189-E039-4A51-BC88-4927E4923AA0}" type="datetimeFigureOut">
               <a:rPr lang="en-US" smtClean="0"/>
-              <a:t>6/13/2016</a:t>
+              <a:t>1/29/21</a:t>
             </a:fld>
             <a:endParaRPr lang="en-US"/>
           </a:p>
@@ -3411,7 +3412,7 @@
           <a:p>
             <a:fld id="{EE6CD189-E039-4A51-BC88-4927E4923AA0}" type="datetimeFigureOut">
               <a:rPr lang="en-US" smtClean="0"/>
-              <a:t>6/13/2016</a:t>
+              <a:t>1/29/21</a:t>
             </a:fld>
             <a:endParaRPr lang="en-US"/>
           </a:p>
@@ -3655,7 +3656,7 @@
           <a:p>
             <a:fld id="{EE6CD189-E039-4A51-BC88-4927E4923AA0}" type="datetimeFigureOut">
               <a:rPr lang="en-US" smtClean="0"/>
-              <a:t>6/13/2016</a:t>
+              <a:t>1/29/21</a:t>
             </a:fld>
             <a:endParaRPr lang="en-US"/>
           </a:p>
@@ -3891,7 +3892,7 @@
           <a:p>
             <a:fld id="{EE6CD189-E039-4A51-BC88-4927E4923AA0}" type="datetimeFigureOut">
               <a:rPr lang="en-US" smtClean="0"/>
-              <a:t>6/13/2016</a:t>
+              <a:t>1/29/21</a:t>
             </a:fld>
             <a:endParaRPr lang="en-US"/>
           </a:p>
@@ -4357,7 +4358,7 @@
           <a:p>
             <a:fld id="{EE6CD189-E039-4A51-BC88-4927E4923AA0}" type="datetimeFigureOut">
               <a:rPr lang="en-US" smtClean="0"/>
-              <a:t>6/13/2016</a:t>
+              <a:t>1/29/21</a:t>
             </a:fld>
             <a:endParaRPr lang="en-US"/>
           </a:p>
@@ -4475,7 +4476,7 @@
           <a:p>
             <a:fld id="{EE6CD189-E039-4A51-BC88-4927E4923AA0}" type="datetimeFigureOut">
               <a:rPr lang="en-US" smtClean="0"/>
-              <a:t>6/13/2016</a:t>
+              <a:t>1/29/21</a:t>
             </a:fld>
             <a:endParaRPr lang="en-US"/>
           </a:p>
@@ -4570,7 +4571,7 @@
           <a:p>
             <a:fld id="{EE6CD189-E039-4A51-BC88-4927E4923AA0}" type="datetimeFigureOut">
               <a:rPr lang="en-US" smtClean="0"/>
-              <a:t>6/13/2016</a:t>
+              <a:t>1/29/21</a:t>
             </a:fld>
             <a:endParaRPr lang="en-US"/>
           </a:p>
@@ -4825,7 +4826,7 @@
           <a:p>
             <a:fld id="{EE6CD189-E039-4A51-BC88-4927E4923AA0}" type="datetimeFigureOut">
               <a:rPr lang="en-US" smtClean="0"/>
-              <a:t>6/13/2016</a:t>
+              <a:t>1/29/21</a:t>
             </a:fld>
             <a:endParaRPr lang="en-US"/>
           </a:p>
@@ -5125,7 +5126,7 @@
           <a:p>
             <a:fld id="{EE6CD189-E039-4A51-BC88-4927E4923AA0}" type="datetimeFigureOut">
               <a:rPr lang="en-US" smtClean="0"/>
-              <a:t>6/13/2016</a:t>
+              <a:t>1/29/21</a:t>
             </a:fld>
             <a:endParaRPr lang="en-US"/>
           </a:p>
@@ -5359,7 +5360,7 @@
           <a:p>
             <a:fld id="{EE6CD189-E039-4A51-BC88-4927E4923AA0}" type="datetimeFigureOut">
               <a:rPr lang="en-US" smtClean="0"/>
-              <a:t>6/13/2016</a:t>
+              <a:t>1/29/21</a:t>
             </a:fld>
             <a:endParaRPr lang="en-US"/>
           </a:p>
@@ -6079,7 +6080,7 @@
           <a:p>
             <a:r>
               <a:rPr lang="en-US" dirty="0"/>
-              <a:t>What is this course about? How much homework is there? How hard will I have to work? Will I pass if I am drunk while doing the homework? Other important questions!</a:t>
+              <a:t>What is this course about? How much homework is there? How hard will I have to work? Will I pass if I don’t do the homework? Other important questions!</a:t>
             </a:r>
           </a:p>
         </p:txBody>
@@ -6132,7 +6133,7 @@
         </p:spPr>
         <p:txBody>
           <a:bodyPr>
-            <a:normAutofit/>
+            <a:normAutofit lnSpcReduction="10000"/>
           </a:bodyPr>
           <a:lstStyle/>
           <a:p>
@@ -6141,7 +6142,7 @@
             </a:pPr>
             <a:r>
               <a:rPr lang="en-US" sz="2400" b="1" dirty="0"/>
-              <a:t>Homework Groups</a:t>
+              <a:t>Homework: The Meat of the Course</a:t>
             </a:r>
           </a:p>
           <a:p>
@@ -6150,7 +6151,13 @@
           <a:p>
             <a:r>
               <a:rPr lang="en-US" dirty="0"/>
-              <a:t>You may work in groups of 2 on the homework. NO MORE!</a:t>
+              <a:t>6 of these</a:t>
+            </a:r>
+          </a:p>
+          <a:p>
+            <a:r>
+              <a:rPr lang="en-US" dirty="0"/>
+              <a:t>one per module (only 6 of 9 modules have a homework)</a:t>
             </a:r>
           </a:p>
           <a:p>
@@ -6159,7 +6166,13 @@
           <a:p>
             <a:r>
               <a:rPr lang="en-US" dirty="0"/>
-              <a:t>Only one submission necessary, but must let us know who your partner was.</a:t>
+              <a:t>Mostly Programming problems</a:t>
+            </a:r>
+          </a:p>
+          <a:p>
+            <a:r>
+              <a:rPr lang="en-US" dirty="0"/>
+              <a:t>Problems will be well-defined, but many solutions possible</a:t>
             </a:r>
           </a:p>
           <a:p>
@@ -6168,16 +6181,21 @@
           <a:p>
             <a:r>
               <a:rPr lang="en-US" dirty="0"/>
-              <a:t>Can have different partners on different assignments if you want.</a:t>
-            </a:r>
-          </a:p>
-          <a:p>
-            <a:endParaRPr lang="en-US" dirty="0"/>
-          </a:p>
-          <a:p>
-            <a:r>
-              <a:rPr lang="en-US" dirty="0"/>
-              <a:t>Collaboration outside of your group, in any way, is an honor violation unless otherwise stated.</a:t>
+              <a:t>For each you will:</a:t>
+            </a:r>
+          </a:p>
+          <a:p>
+            <a:pPr lvl="1"/>
+            <a:r>
+              <a:rPr lang="en-US" dirty="0"/>
+              <a:t>Turn in your code</a:t>
+            </a:r>
+          </a:p>
+          <a:p>
+            <a:pPr lvl="1"/>
+            <a:r>
+              <a:rPr lang="en-US" dirty="0"/>
+              <a:t>Usually some kind of write-up regarding your solution</a:t>
             </a:r>
           </a:p>
         </p:txBody>
@@ -6224,7 +6242,7 @@
     </p:spTree>
     <p:extLst>
       <p:ext uri="{BB962C8B-B14F-4D97-AF65-F5344CB8AC3E}">
-        <p14:creationId xmlns:p14="http://schemas.microsoft.com/office/powerpoint/2010/main" val="9403813"/>
+        <p14:creationId xmlns:p14="http://schemas.microsoft.com/office/powerpoint/2010/main" val="3537748648"/>
       </p:ext>
     </p:extLst>
   </p:cSld>
@@ -6277,12 +6295,8 @@
               <a:buNone/>
             </a:pPr>
             <a:r>
-              <a:rPr lang="en-US" sz="2400" b="1" dirty="0" err="1"/>
-              <a:t>Homeworks</a:t>
-            </a:r>
-            <a:r>
               <a:rPr lang="en-US" sz="2400" b="1" dirty="0"/>
-              <a:t>:</a:t>
+              <a:t>Homework: The Meat of the Course</a:t>
             </a:r>
           </a:p>
           <a:p>
@@ -6291,44 +6305,68 @@
           <a:p>
             <a:r>
               <a:rPr lang="en-US" dirty="0"/>
-              <a:t>HW 1: Automatic Theorem Prover</a:t>
-            </a:r>
-          </a:p>
-          <a:p>
+              <a:t>Recommendations:</a:t>
+            </a:r>
+          </a:p>
+          <a:p>
+            <a:pPr lvl="1"/>
+            <a:r>
+              <a:rPr lang="en-US" dirty="0"/>
+              <a:t>Start Early!! These HWs generally are not of the “just implement something” form.</a:t>
+            </a:r>
+          </a:p>
+          <a:p>
+            <a:pPr lvl="1"/>
+            <a:r>
+              <a:rPr lang="en-US" dirty="0"/>
+              <a:t>You will need to:</a:t>
+            </a:r>
+          </a:p>
+          <a:p>
+            <a:pPr lvl="2"/>
+            <a:r>
+              <a:rPr lang="en-US" dirty="0"/>
+              <a:t>Implement an algorithm</a:t>
+            </a:r>
+          </a:p>
+          <a:p>
+            <a:pPr lvl="2"/>
+            <a:r>
+              <a:rPr lang="en-US" dirty="0"/>
+              <a:t>Test it, see where it does well and fails</a:t>
+            </a:r>
+          </a:p>
+          <a:p>
+            <a:pPr lvl="2"/>
+            <a:r>
+              <a:rPr lang="en-US" dirty="0"/>
+              <a:t>Tweak it and see how performance changes</a:t>
+            </a:r>
+          </a:p>
+          <a:p>
+            <a:pPr lvl="2"/>
+            <a:r>
+              <a:rPr lang="en-US" dirty="0"/>
+              <a:t>Test on MANY different types of inputs</a:t>
+            </a:r>
+          </a:p>
+          <a:p>
+            <a:pPr lvl="2"/>
+            <a:r>
+              <a:rPr lang="en-US" dirty="0"/>
+              <a:t>Analyze the differences</a:t>
+            </a:r>
+          </a:p>
+          <a:p>
+            <a:pPr lvl="2"/>
+            <a:r>
+              <a:rPr lang="en-US" dirty="0"/>
+              <a:t>Write an analytical paper about it</a:t>
+            </a:r>
+          </a:p>
+          <a:p>
+            <a:pPr lvl="1"/>
             <a:endParaRPr lang="en-US" dirty="0"/>
-          </a:p>
-          <a:p>
-            <a:r>
-              <a:rPr lang="en-US" dirty="0"/>
-              <a:t>HW 2: Pathfinding (with a  probabilistic twist!)</a:t>
-            </a:r>
-          </a:p>
-          <a:p>
-            <a:endParaRPr lang="en-US" dirty="0"/>
-          </a:p>
-          <a:p>
-            <a:r>
-              <a:rPr lang="en-US" dirty="0"/>
-              <a:t>HW 3: Ticket To Ride AI</a:t>
-            </a:r>
-          </a:p>
-          <a:p>
-            <a:endParaRPr lang="en-US" dirty="0"/>
-          </a:p>
-          <a:p>
-            <a:r>
-              <a:rPr lang="en-US" dirty="0"/>
-              <a:t>HW 4: Negotiation</a:t>
-            </a:r>
-          </a:p>
-          <a:p>
-            <a:endParaRPr lang="en-US" dirty="0"/>
-          </a:p>
-          <a:p>
-            <a:r>
-              <a:rPr lang="en-US" dirty="0"/>
-              <a:t>HW 5: Machine Learning</a:t>
-            </a:r>
           </a:p>
         </p:txBody>
       </p:sp>
@@ -6374,7 +6412,7 @@
     </p:spTree>
     <p:extLst>
       <p:ext uri="{BB962C8B-B14F-4D97-AF65-F5344CB8AC3E}">
-        <p14:creationId xmlns:p14="http://schemas.microsoft.com/office/powerpoint/2010/main" val="1712635795"/>
+        <p14:creationId xmlns:p14="http://schemas.microsoft.com/office/powerpoint/2010/main" val="4281366638"/>
       </p:ext>
     </p:extLst>
   </p:cSld>
@@ -6428,7 +6466,7 @@
             </a:pPr>
             <a:r>
               <a:rPr lang="en-US" sz="2400" b="1" dirty="0"/>
-              <a:t>Homework: Late Policy</a:t>
+              <a:t>Homework Groups</a:t>
             </a:r>
           </a:p>
           <a:p>
@@ -6436,55 +6474,12 @@
           </a:p>
           <a:p>
             <a:r>
-              <a:rPr lang="en-US" dirty="0"/>
-              <a:t>You may use up to two late days throughout the semester</a:t>
-            </a:r>
-          </a:p>
-          <a:p>
-            <a:endParaRPr lang="en-US" dirty="0"/>
-          </a:p>
-          <a:p>
-            <a:r>
-              <a:rPr lang="en-US" dirty="0"/>
-              <a:t>This means you cannot complain about various things that happen to you</a:t>
-            </a:r>
-          </a:p>
-          <a:p>
-            <a:pPr lvl="1"/>
-            <a:r>
-              <a:rPr lang="en-US" dirty="0"/>
-              <a:t>Interviews</a:t>
-            </a:r>
-          </a:p>
-          <a:p>
-            <a:pPr lvl="1"/>
-            <a:r>
-              <a:rPr lang="en-US" dirty="0"/>
-              <a:t>Emergencies</a:t>
-            </a:r>
-          </a:p>
-          <a:p>
-            <a:pPr lvl="1"/>
-            <a:r>
-              <a:rPr lang="en-US" dirty="0"/>
-              <a:t>Etc.</a:t>
-            </a:r>
-          </a:p>
-          <a:p>
-            <a:pPr lvl="1"/>
-            <a:r>
-              <a:rPr lang="en-US" dirty="0"/>
-              <a:t>…this is what the late days are for</a:t>
-            </a:r>
-          </a:p>
-          <a:p>
-            <a:pPr lvl="1"/>
-            <a:endParaRPr lang="en-US" dirty="0"/>
-          </a:p>
-          <a:p>
-            <a:r>
-              <a:rPr lang="en-US" dirty="0"/>
-              <a:t>Of course, happy to discuss truly extraordinary circumstances</a:t>
+              <a:rPr lang="en-US" dirty="0" err="1"/>
+              <a:t>Homeworks</a:t>
+            </a:r>
+            <a:r>
+              <a:rPr lang="en-US" dirty="0"/>
+              <a:t> must be done individually, but you can collaborate with friends to discuss high level problems, solutions, etc.</a:t>
             </a:r>
           </a:p>
         </p:txBody>
@@ -6531,7 +6526,7 @@
     </p:spTree>
     <p:extLst>
       <p:ext uri="{BB962C8B-B14F-4D97-AF65-F5344CB8AC3E}">
-        <p14:creationId xmlns:p14="http://schemas.microsoft.com/office/powerpoint/2010/main" val="1918432865"/>
+        <p14:creationId xmlns:p14="http://schemas.microsoft.com/office/powerpoint/2010/main" val="9403813"/>
       </p:ext>
     </p:extLst>
   </p:cSld>
@@ -6584,8 +6579,18 @@
               <a:buNone/>
             </a:pPr>
             <a:r>
+              <a:rPr lang="en-US" sz="2400" b="1" dirty="0" err="1"/>
+              <a:t>Homeworks</a:t>
+            </a:r>
+            <a:r>
               <a:rPr lang="en-US" sz="2400" b="1" dirty="0"/>
-              <a:t>Grading</a:t>
+              <a:t>:</a:t>
+            </a:r>
+          </a:p>
+          <a:p>
+            <a:r>
+              <a:rPr lang="en-US" dirty="0"/>
+              <a:t>HW 0: Is AI Possible? (Report)</a:t>
             </a:r>
           </a:p>
           <a:p>
@@ -6594,30 +6599,16 @@
           <a:p>
             <a:r>
               <a:rPr lang="en-US" dirty="0"/>
-              <a:t>25% Midterms</a:t>
-            </a:r>
-          </a:p>
-          <a:p>
-            <a:r>
-              <a:rPr lang="en-US" dirty="0"/>
-              <a:t>20% Final Exam</a:t>
-            </a:r>
-          </a:p>
-          <a:p>
-            <a:r>
-              <a:rPr lang="en-US" dirty="0"/>
-              <a:t>50% </a:t>
-            </a:r>
-            <a:r>
-              <a:rPr lang="en-US" dirty="0" err="1"/>
-              <a:t>Homeworks</a:t>
-            </a:r>
+              <a:t>HW 1: Automatic Theorem Prover</a:t>
+            </a:r>
+          </a:p>
+          <a:p>
             <a:endParaRPr lang="en-US" dirty="0"/>
           </a:p>
           <a:p>
             <a:r>
               <a:rPr lang="en-US" dirty="0"/>
-              <a:t>5% Attendance / Participation</a:t>
+              <a:t>HW 2: Pathfinding (with a  probabilistic twist!)</a:t>
             </a:r>
           </a:p>
           <a:p>
@@ -6626,29 +6617,38 @@
           <a:p>
             <a:r>
               <a:rPr lang="en-US" dirty="0"/>
-              <a:t>Keeping it simple</a:t>
-            </a:r>
-          </a:p>
-          <a:p>
-            <a:pPr marL="36900" indent="0">
-              <a:buNone/>
-            </a:pPr>
+              <a:t>HW 3: Ticket To Ride AI</a:t>
+            </a:r>
+          </a:p>
+          <a:p>
             <a:endParaRPr lang="en-US" dirty="0"/>
           </a:p>
           <a:p>
+            <a:r>
+              <a:rPr lang="en-US" dirty="0"/>
+              <a:t>HW 4: Negotiation</a:t>
+            </a:r>
+          </a:p>
+          <a:p>
             <a:endParaRPr lang="en-US" dirty="0"/>
+          </a:p>
+          <a:p>
+            <a:r>
+              <a:rPr lang="en-US" dirty="0"/>
+              <a:t>HW 5: Machine Learning</a:t>
+            </a:r>
           </a:p>
         </p:txBody>
       </p:sp>
       <p:pic>
         <p:nvPicPr>
-          <p:cNvPr id="8194" name="Picture 2" descr="Memes and grades"/>
+          <p:cNvPr id="7170" name="Picture 2" descr="http://www.dumpaday.com/wp-content/uploads/2013/01/doing-your-homework-funny-quotes.jpg"/>
           <p:cNvPicPr>
             <a:picLocks noChangeAspect="1" noChangeArrowheads="1"/>
           </p:cNvPicPr>
           <p:nvPr/>
         </p:nvPicPr>
-        <p:blipFill>
+        <p:blipFill rotWithShape="1">
           <a:blip r:embed="rId2">
             <a:extLst>
               <a:ext uri="{28A0092B-C50C-407E-A947-70E740481C1C}">
@@ -6656,15 +6656,13 @@
               </a:ext>
             </a:extLst>
           </a:blip>
-          <a:srcRect/>
-          <a:stretch>
-            <a:fillRect/>
-          </a:stretch>
+          <a:srcRect l="-919" t="9604" r="275" b="5236"/>
+          <a:stretch/>
         </p:blipFill>
         <p:spPr bwMode="auto">
           <a:xfrm>
-            <a:off x="529199" y="1487207"/>
-            <a:ext cx="5193173" cy="4705016"/>
+            <a:off x="91440" y="1648872"/>
+            <a:ext cx="5943600" cy="4023360"/>
           </a:xfrm>
           <a:prstGeom prst="rect">
             <a:avLst/>
@@ -6684,7 +6682,7 @@
     </p:spTree>
     <p:extLst>
       <p:ext uri="{BB962C8B-B14F-4D97-AF65-F5344CB8AC3E}">
-        <p14:creationId xmlns:p14="http://schemas.microsoft.com/office/powerpoint/2010/main" val="147712355"/>
+        <p14:creationId xmlns:p14="http://schemas.microsoft.com/office/powerpoint/2010/main" val="1712635795"/>
       </p:ext>
     </p:extLst>
   </p:cSld>
@@ -6738,7 +6736,7 @@
             </a:pPr>
             <a:r>
               <a:rPr lang="en-US" sz="2400" b="1" dirty="0"/>
-              <a:t>Cheating</a:t>
+              <a:t>Homework: Late Policy</a:t>
             </a:r>
           </a:p>
           <a:p>
@@ -6747,56 +6745,151 @@
           <a:p>
             <a:r>
               <a:rPr lang="en-US" dirty="0"/>
-              <a:t>Let’s define cheating:</a:t>
-            </a:r>
-          </a:p>
-          <a:p>
-            <a:pPr lvl="1"/>
-            <a:r>
-              <a:rPr lang="en-US" dirty="0"/>
-              <a:t>Looking at someone else’s code (online or elsewhere)</a:t>
-            </a:r>
-          </a:p>
-          <a:p>
-            <a:pPr lvl="1"/>
-            <a:r>
-              <a:rPr lang="en-US" dirty="0"/>
-              <a:t>Someone outside your group writing your code</a:t>
-            </a:r>
-          </a:p>
-          <a:p>
-            <a:pPr lvl="1"/>
+              <a:t>Deadlines are extremely flexible in this course.</a:t>
+            </a:r>
+          </a:p>
+          <a:p>
             <a:endParaRPr lang="en-US" dirty="0"/>
           </a:p>
           <a:p>
             <a:r>
               <a:rPr lang="en-US" dirty="0"/>
-              <a:t>Not cheating:</a:t>
-            </a:r>
-          </a:p>
-          <a:p>
-            <a:pPr lvl="1"/>
-            <a:r>
-              <a:rPr lang="en-US" dirty="0"/>
-              <a:t>Discussing the HW at a high level</a:t>
-            </a:r>
-          </a:p>
-          <a:p>
-            <a:pPr lvl="1"/>
-            <a:r>
-              <a:rPr lang="en-US" dirty="0"/>
-              <a:t>Looking at pseudo-code or instructional videos online (as long as there is no code)</a:t>
-            </a:r>
-          </a:p>
-          <a:p>
-            <a:pPr lvl="1"/>
-            <a:endParaRPr lang="en-US" dirty="0"/>
+              <a:t>Let’s look at the course schedule!!</a:t>
+            </a:r>
           </a:p>
         </p:txBody>
       </p:sp>
       <p:pic>
         <p:nvPicPr>
-          <p:cNvPr id="12290" name="Picture 2" descr="http://funny-lover.com/wp-content/uploads/2014/03/cheating-it-hurts-everyone.jpg"/>
+          <p:cNvPr id="7170" name="Picture 2" descr="http://www.dumpaday.com/wp-content/uploads/2013/01/doing-your-homework-funny-quotes.jpg"/>
+          <p:cNvPicPr>
+            <a:picLocks noChangeAspect="1" noChangeArrowheads="1"/>
+          </p:cNvPicPr>
+          <p:nvPr/>
+        </p:nvPicPr>
+        <p:blipFill rotWithShape="1">
+          <a:blip r:embed="rId2">
+            <a:extLst>
+              <a:ext uri="{28A0092B-C50C-407E-A947-70E740481C1C}">
+                <a14:useLocalDpi xmlns:a14="http://schemas.microsoft.com/office/drawing/2010/main" val="0"/>
+              </a:ext>
+            </a:extLst>
+          </a:blip>
+          <a:srcRect l="-919" t="9604" r="275" b="5236"/>
+          <a:stretch/>
+        </p:blipFill>
+        <p:spPr bwMode="auto">
+          <a:xfrm>
+            <a:off x="91440" y="1648872"/>
+            <a:ext cx="5943600" cy="4023360"/>
+          </a:xfrm>
+          <a:prstGeom prst="rect">
+            <a:avLst/>
+          </a:prstGeom>
+          <a:noFill/>
+          <a:extLst>
+            <a:ext uri="{909E8E84-426E-40DD-AFC4-6F175D3DCCD1}">
+              <a14:hiddenFill xmlns:a14="http://schemas.microsoft.com/office/drawing/2010/main">
+                <a:solidFill>
+                  <a:srgbClr val="FFFFFF"/>
+                </a:solidFill>
+              </a14:hiddenFill>
+            </a:ext>
+          </a:extLst>
+        </p:spPr>
+      </p:pic>
+    </p:spTree>
+    <p:extLst>
+      <p:ext uri="{BB962C8B-B14F-4D97-AF65-F5344CB8AC3E}">
+        <p14:creationId xmlns:p14="http://schemas.microsoft.com/office/powerpoint/2010/main" val="1918432865"/>
+      </p:ext>
+    </p:extLst>
+  </p:cSld>
+  <p:clrMapOvr>
+    <a:masterClrMapping/>
+  </p:clrMapOvr>
+</p:sld>
+</file>
+
+<file path=ppt/slides/slide15.xml><?xml version="1.0" encoding="utf-8"?>
+<p:sld xmlns:a="http://schemas.openxmlformats.org/drawingml/2006/main" xmlns:r="http://schemas.openxmlformats.org/officeDocument/2006/relationships" xmlns:p="http://schemas.openxmlformats.org/presentationml/2006/main">
+  <p:cSld>
+    <p:spTree>
+      <p:nvGrpSpPr>
+        <p:cNvPr id="1" name=""/>
+        <p:cNvGrpSpPr/>
+        <p:nvPr/>
+      </p:nvGrpSpPr>
+      <p:grpSpPr>
+        <a:xfrm>
+          <a:off x="0" y="0"/>
+          <a:ext cx="0" cy="0"/>
+          <a:chOff x="0" y="0"/>
+          <a:chExt cx="0" cy="0"/>
+        </a:xfrm>
+      </p:grpSpPr>
+      <p:sp>
+        <p:nvSpPr>
+          <p:cNvPr id="3" name="Content Placeholder 2"/>
+          <p:cNvSpPr>
+            <a:spLocks noGrp="1"/>
+          </p:cNvSpPr>
+          <p:nvPr>
+            <p:ph idx="1"/>
+          </p:nvPr>
+        </p:nvSpPr>
+        <p:spPr>
+          <a:xfrm>
+            <a:off x="6318737" y="808894"/>
+            <a:ext cx="5298831" cy="5673967"/>
+          </a:xfrm>
+        </p:spPr>
+        <p:txBody>
+          <a:bodyPr>
+            <a:normAutofit/>
+          </a:bodyPr>
+          <a:lstStyle/>
+          <a:p>
+            <a:pPr marL="36900" indent="0" algn="ctr">
+              <a:buNone/>
+            </a:pPr>
+            <a:r>
+              <a:rPr lang="en-US" sz="2400" b="1" dirty="0"/>
+              <a:t>Grading</a:t>
+            </a:r>
+          </a:p>
+          <a:p>
+            <a:endParaRPr lang="en-US" dirty="0"/>
+          </a:p>
+          <a:p>
+            <a:r>
+              <a:rPr lang="en-US" dirty="0"/>
+              <a:t>Let’s look at the grading scheme on the course website!!</a:t>
+            </a:r>
+          </a:p>
+          <a:p>
+            <a:endParaRPr lang="en-US" dirty="0"/>
+          </a:p>
+          <a:p>
+            <a:r>
+              <a:rPr lang="en-US" dirty="0"/>
+              <a:t>Not too crazy, but warrants an explanation.</a:t>
+            </a:r>
+          </a:p>
+          <a:p>
+            <a:pPr marL="36900" indent="0">
+              <a:buNone/>
+            </a:pPr>
+            <a:endParaRPr lang="en-US" dirty="0"/>
+          </a:p>
+          <a:p>
+            <a:endParaRPr lang="en-US" dirty="0"/>
+          </a:p>
+        </p:txBody>
+      </p:sp>
+      <p:pic>
+        <p:nvPicPr>
+          <p:cNvPr id="8194" name="Picture 2" descr="Memes and grades"/>
           <p:cNvPicPr>
             <a:picLocks noChangeAspect="1" noChangeArrowheads="1"/>
           </p:cNvPicPr>
@@ -6817,8 +6910,8 @@
         </p:blipFill>
         <p:spPr bwMode="auto">
           <a:xfrm>
-            <a:off x="293924" y="1571831"/>
-            <a:ext cx="5851955" cy="4691317"/>
+            <a:off x="529199" y="1487207"/>
+            <a:ext cx="5193173" cy="4705016"/>
           </a:xfrm>
           <a:prstGeom prst="rect">
             <a:avLst/>
@@ -6838,7 +6931,7 @@
     </p:spTree>
     <p:extLst>
       <p:ext uri="{BB962C8B-B14F-4D97-AF65-F5344CB8AC3E}">
-        <p14:creationId xmlns:p14="http://schemas.microsoft.com/office/powerpoint/2010/main" val="3123417240"/>
+        <p14:creationId xmlns:p14="http://schemas.microsoft.com/office/powerpoint/2010/main" val="147712355"/>
       </p:ext>
     </p:extLst>
   </p:cSld>
@@ -6848,7 +6941,7 @@
 </p:sld>
 </file>
 
-<file path=ppt/slides/slide15.xml><?xml version="1.0" encoding="utf-8"?>
+<file path=ppt/slides/slide16.xml><?xml version="1.0" encoding="utf-8"?>
 <p:sld xmlns:a="http://schemas.openxmlformats.org/drawingml/2006/main" xmlns:r="http://schemas.openxmlformats.org/officeDocument/2006/relationships" xmlns:p="http://schemas.openxmlformats.org/presentationml/2006/main">
   <p:cSld>
     <p:spTree>
@@ -7064,14 +7157,21 @@
             <a:pPr lvl="1"/>
             <a:r>
               <a:rPr lang="en-US" dirty="0"/>
-              <a:t>MTWRF @ 10:30-12:45</a:t>
+              <a:t>Tu Th @ 11:00-12:15</a:t>
             </a:r>
           </a:p>
           <a:p>
             <a:pPr lvl="2"/>
             <a:r>
               <a:rPr lang="en-US" dirty="0"/>
-              <a:t>With breaks…of course!</a:t>
+              <a:t>On Zoom!</a:t>
+            </a:r>
+          </a:p>
+          <a:p>
+            <a:pPr lvl="2"/>
+            <a:r>
+              <a:rPr lang="en-US" dirty="0"/>
+              <a:t>Live and in-person!</a:t>
             </a:r>
           </a:p>
           <a:p>
@@ -7101,19 +7201,6 @@
           <a:p>
             <a:pPr lvl="1"/>
             <a:endParaRPr lang="en-US" dirty="0"/>
-          </a:p>
-          <a:p>
-            <a:r>
-              <a:rPr lang="en-US" dirty="0"/>
-              <a:t>TAs:</a:t>
-            </a:r>
-          </a:p>
-          <a:p>
-            <a:pPr lvl="1"/>
-            <a:r>
-              <a:rPr lang="en-US" dirty="0"/>
-              <a:t>Yuchi Tian (yt8mn@virginia.edu)</a:t>
-            </a:r>
           </a:p>
         </p:txBody>
       </p:sp>
@@ -7205,15 +7292,14 @@
           </a:xfrm>
         </p:spPr>
         <p:txBody>
-          <a:bodyPr/>
+          <a:bodyPr>
+            <a:normAutofit/>
+          </a:bodyPr>
           <a:lstStyle/>
           <a:p>
-            <a:pPr marL="36900" indent="0" algn="ctr">
-              <a:buNone/>
-            </a:pPr>
-            <a:r>
-              <a:rPr lang="en-US" sz="2400" b="1" dirty="0"/>
-              <a:t>Pre-requisites</a:t>
+            <a:r>
+              <a:rPr lang="en-US" dirty="0"/>
+              <a:t>Course Staff:</a:t>
             </a:r>
           </a:p>
           <a:p>
@@ -7222,29 +7308,32 @@
           <a:p>
             <a:r>
               <a:rPr lang="en-US" dirty="0"/>
-              <a:t>Absolutely Required:</a:t>
+              <a:t>Graduate:</a:t>
             </a:r>
           </a:p>
           <a:p>
             <a:pPr lvl="1"/>
             <a:r>
               <a:rPr lang="en-US" dirty="0"/>
-              <a:t>CS2150 (</a:t>
+              <a:t>Ryan </a:t>
             </a:r>
             <a:r>
               <a:rPr lang="en-US" dirty="0" err="1"/>
-              <a:t>Prog</a:t>
-            </a:r>
-            <a:r>
-              <a:rPr lang="en-US" dirty="0"/>
-              <a:t>. and Data Rep.)</a:t>
-            </a:r>
-          </a:p>
-          <a:p>
-            <a:pPr lvl="1"/>
-            <a:r>
-              <a:rPr lang="en-US" dirty="0"/>
-              <a:t>CS2102 (Discrete Math)</a:t>
+              <a:t>Kann</a:t>
+            </a:r>
+            <a:r>
+              <a:rPr lang="en-US" dirty="0"/>
+              <a:t> (</a:t>
+            </a:r>
+            <a:r>
+              <a:rPr lang="en-US" dirty="0">
+                <a:hlinkClick r:id="rId2"/>
+              </a:rPr>
+              <a:t>rak3me@virginia.edu</a:t>
+            </a:r>
+            <a:r>
+              <a:rPr lang="en-US" dirty="0"/>
+              <a:t>)</a:t>
             </a:r>
           </a:p>
           <a:p>
@@ -7254,43 +7343,109 @@
           <a:p>
             <a:r>
               <a:rPr lang="en-US" dirty="0"/>
-              <a:t>Helpful, but not (technically) required:</a:t>
+              <a:t>Undergraduate</a:t>
             </a:r>
           </a:p>
           <a:p>
             <a:pPr lvl="1"/>
             <a:r>
               <a:rPr lang="en-US" dirty="0"/>
-              <a:t>CS4102 (Algorithms)</a:t>
+              <a:t>Helen Shi (</a:t>
+            </a:r>
+            <a:r>
+              <a:rPr lang="en-US" dirty="0">
+                <a:hlinkClick r:id="rId3"/>
+              </a:rPr>
+              <a:t>hs2fw@virginia.edu</a:t>
+            </a:r>
+            <a:r>
+              <a:rPr lang="en-US" dirty="0"/>
+              <a:t>)</a:t>
             </a:r>
           </a:p>
           <a:p>
             <a:pPr lvl="1"/>
             <a:r>
               <a:rPr lang="en-US" dirty="0"/>
-              <a:t>Probability</a:t>
-            </a:r>
-          </a:p>
-          <a:p>
-            <a:pPr lvl="2"/>
-            <a:r>
-              <a:rPr lang="en-US" dirty="0"/>
-              <a:t>We’ll review some of this when necessary</a:t>
+              <a:t>Sabrina Baldassare (</a:t>
+            </a:r>
+            <a:r>
+              <a:rPr lang="en-US" dirty="0">
+                <a:hlinkClick r:id="rId4"/>
+              </a:rPr>
+              <a:t>sjb4sy@virginia.edu</a:t>
+            </a:r>
+            <a:r>
+              <a:rPr lang="en-US" dirty="0"/>
+              <a:t>)</a:t>
             </a:r>
           </a:p>
           <a:p>
             <a:pPr lvl="1"/>
             <a:r>
-              <a:rPr lang="en-US" dirty="0"/>
-              <a:t>Statistics</a:t>
-            </a:r>
-          </a:p>
-          <a:p>
-            <a:pPr lvl="2"/>
-            <a:r>
-              <a:rPr lang="en-US" dirty="0"/>
-              <a:t>Not much, but a little stat is helpful</a:t>
-            </a:r>
+              <a:rPr lang="en-US" dirty="0" err="1"/>
+              <a:t>Tanay</a:t>
+            </a:r>
+            <a:r>
+              <a:rPr lang="en-US" dirty="0"/>
+              <a:t> Bapat (</a:t>
+            </a:r>
+            <a:r>
+              <a:rPr lang="en-US" dirty="0">
+                <a:hlinkClick r:id="rId5"/>
+              </a:rPr>
+              <a:t>tb6xr@virginia.edu</a:t>
+            </a:r>
+            <a:r>
+              <a:rPr lang="en-US" dirty="0"/>
+              <a:t>)</a:t>
+            </a:r>
+          </a:p>
+          <a:p>
+            <a:pPr lvl="1"/>
+            <a:r>
+              <a:rPr lang="en-US" dirty="0"/>
+              <a:t>Vivian Chen (</a:t>
+            </a:r>
+            <a:r>
+              <a:rPr lang="en-US" dirty="0">
+                <a:hlinkClick r:id="rId6"/>
+              </a:rPr>
+              <a:t>sc9by@virginia.edu</a:t>
+            </a:r>
+            <a:r>
+              <a:rPr lang="en-US" dirty="0"/>
+              <a:t>)</a:t>
+            </a:r>
+          </a:p>
+          <a:p>
+            <a:pPr lvl="1"/>
+            <a:r>
+              <a:rPr lang="en-US" dirty="0"/>
+              <a:t>Danielle </a:t>
+            </a:r>
+            <a:r>
+              <a:rPr lang="en-US" dirty="0" err="1"/>
+              <a:t>Zevitz</a:t>
+            </a:r>
+            <a:r>
+              <a:rPr lang="en-US" dirty="0"/>
+              <a:t>	(</a:t>
+            </a:r>
+            <a:r>
+              <a:rPr lang="en-US" dirty="0">
+                <a:hlinkClick r:id="rId7"/>
+              </a:rPr>
+              <a:t>dez8dc@virginia.edu</a:t>
+            </a:r>
+            <a:r>
+              <a:rPr lang="en-US" dirty="0"/>
+              <a:t>)</a:t>
+            </a:r>
+          </a:p>
+          <a:p>
+            <a:pPr lvl="1"/>
+            <a:endParaRPr lang="en-US" dirty="0"/>
           </a:p>
         </p:txBody>
       </p:sp>
@@ -7303,7 +7458,7 @@
           <p:nvPr/>
         </p:nvPicPr>
         <p:blipFill>
-          <a:blip r:embed="rId2">
+          <a:blip r:embed="rId8">
             <a:extLst>
               <a:ext uri="{28A0092B-C50C-407E-A947-70E740481C1C}">
                 <a14:useLocalDpi xmlns:a14="http://schemas.microsoft.com/office/drawing/2010/main" val="0"/>
@@ -7338,7 +7493,7 @@
     </p:spTree>
     <p:extLst>
       <p:ext uri="{BB962C8B-B14F-4D97-AF65-F5344CB8AC3E}">
-        <p14:creationId xmlns:p14="http://schemas.microsoft.com/office/powerpoint/2010/main" val="1077241134"/>
+        <p14:creationId xmlns:p14="http://schemas.microsoft.com/office/powerpoint/2010/main" val="3016469836"/>
       </p:ext>
     </p:extLst>
   </p:cSld>
@@ -7390,64 +7545,38 @@
             </a:pPr>
             <a:r>
               <a:rPr lang="en-US" sz="2400" b="1" dirty="0"/>
-              <a:t>I Expect You to Know</a:t>
-            </a:r>
-          </a:p>
-          <a:p>
-            <a:r>
-              <a:rPr lang="en-US" dirty="0"/>
-              <a:t>Graphs</a:t>
+              <a:t>Pre-requisites</a:t>
+            </a:r>
+          </a:p>
+          <a:p>
+            <a:endParaRPr lang="en-US" dirty="0"/>
+          </a:p>
+          <a:p>
+            <a:r>
+              <a:rPr lang="en-US" dirty="0"/>
+              <a:t>Absolutely Required:</a:t>
             </a:r>
           </a:p>
           <a:p>
             <a:pPr lvl="1"/>
             <a:r>
               <a:rPr lang="en-US" dirty="0"/>
-              <a:t>Comfortable implementing a graph</a:t>
-            </a:r>
-          </a:p>
-          <a:p>
-            <a:pPr lvl="2"/>
-            <a:r>
-              <a:rPr lang="en-US" dirty="0"/>
-              <a:t>Adj. List or Adj. Matrix</a:t>
+              <a:t>CS2150 (</a:t>
+            </a:r>
+            <a:r>
+              <a:rPr lang="en-US" dirty="0" err="1"/>
+              <a:t>Prog</a:t>
+            </a:r>
+            <a:r>
+              <a:rPr lang="en-US" dirty="0"/>
+              <a:t>. and Data Rep.)</a:t>
             </a:r>
           </a:p>
           <a:p>
             <a:pPr lvl="1"/>
             <a:r>
               <a:rPr lang="en-US" dirty="0"/>
-              <a:t>If you aren’t comfortable with graphs, review them NOW!</a:t>
-            </a:r>
-          </a:p>
-          <a:p>
-            <a:pPr lvl="1"/>
-            <a:r>
-              <a:rPr lang="en-US" dirty="0"/>
-              <a:t>At some point, we will do a VERY short review of this</a:t>
-            </a:r>
-          </a:p>
-          <a:p>
-            <a:endParaRPr lang="en-US" dirty="0"/>
-          </a:p>
-          <a:p>
-            <a:r>
-              <a:rPr lang="en-US" dirty="0"/>
-              <a:t>Basic Discrete Math Material</a:t>
-            </a:r>
-          </a:p>
-          <a:p>
-            <a:pPr lvl="1"/>
-            <a:r>
-              <a:rPr lang="en-US" dirty="0"/>
-              <a:t>Propositional Logic</a:t>
-            </a:r>
-          </a:p>
-          <a:p>
-            <a:pPr lvl="1"/>
-            <a:r>
-              <a:rPr lang="en-US" dirty="0"/>
-              <a:t>Basic logic and inference</a:t>
+              <a:t>CS2102 (Discrete Math)</a:t>
             </a:r>
           </a:p>
           <a:p>
@@ -7455,14 +7584,51 @@
             <a:endParaRPr lang="en-US" dirty="0"/>
           </a:p>
           <a:p>
+            <a:r>
+              <a:rPr lang="en-US" dirty="0"/>
+              <a:t>Helpful, but not (technically) required:</a:t>
+            </a:r>
+          </a:p>
+          <a:p>
+            <a:pPr lvl="1"/>
+            <a:r>
+              <a:rPr lang="en-US" dirty="0"/>
+              <a:t>CS4102 (Algorithms)</a:t>
+            </a:r>
+          </a:p>
+          <a:p>
+            <a:pPr lvl="1"/>
+            <a:r>
+              <a:rPr lang="en-US" dirty="0"/>
+              <a:t>Probability</a:t>
+            </a:r>
+          </a:p>
+          <a:p>
             <a:pPr lvl="2"/>
-            <a:endParaRPr lang="en-US" dirty="0"/>
+            <a:r>
+              <a:rPr lang="en-US" dirty="0"/>
+              <a:t>We’ll review some of this when necessary</a:t>
+            </a:r>
+          </a:p>
+          <a:p>
+            <a:pPr lvl="1"/>
+            <a:r>
+              <a:rPr lang="en-US" dirty="0"/>
+              <a:t>Statistics</a:t>
+            </a:r>
+          </a:p>
+          <a:p>
+            <a:pPr lvl="2"/>
+            <a:r>
+              <a:rPr lang="en-US" dirty="0"/>
+              <a:t>Not much, but a little stat is helpful</a:t>
+            </a:r>
           </a:p>
         </p:txBody>
       </p:sp>
       <p:pic>
         <p:nvPicPr>
-          <p:cNvPr id="2050" name="Picture 2" descr="http://www1.pcmag.com/media/images/347846-artificial-intelligence.jpg"/>
+          <p:cNvPr id="1026" name="Picture 2" descr="https://sp.yimg.com/ib/th?id=HN.608005616744729845&amp;pid=15.1&amp;P=0"/>
           <p:cNvPicPr>
             <a:picLocks noChangeAspect="1" noChangeArrowheads="1"/>
           </p:cNvPicPr>
@@ -7483,8 +7649,8 @@
         </p:blipFill>
         <p:spPr bwMode="auto">
           <a:xfrm>
-            <a:off x="349321" y="1456166"/>
-            <a:ext cx="5645442" cy="3178175"/>
+            <a:off x="647943" y="808894"/>
+            <a:ext cx="4898781" cy="4898781"/>
           </a:xfrm>
           <a:prstGeom prst="rect">
             <a:avLst/>
@@ -7504,7 +7670,7 @@
     </p:spTree>
     <p:extLst>
       <p:ext uri="{BB962C8B-B14F-4D97-AF65-F5344CB8AC3E}">
-        <p14:creationId xmlns:p14="http://schemas.microsoft.com/office/powerpoint/2010/main" val="1503045457"/>
+        <p14:creationId xmlns:p14="http://schemas.microsoft.com/office/powerpoint/2010/main" val="1077241134"/>
       </p:ext>
     </p:extLst>
   </p:cSld>
@@ -7556,79 +7722,79 @@
             </a:pPr>
             <a:r>
               <a:rPr lang="en-US" sz="2400" b="1" dirty="0"/>
-              <a:t>Textbook (Required)</a:t>
-            </a:r>
-          </a:p>
-          <a:p>
-            <a:pPr marL="450000" lvl="1" indent="0">
-              <a:buNone/>
-            </a:pPr>
+              <a:t>I Expect You to Know</a:t>
+            </a:r>
+          </a:p>
+          <a:p>
+            <a:r>
+              <a:rPr lang="en-US" dirty="0"/>
+              <a:t>Graphs</a:t>
+            </a:r>
+          </a:p>
+          <a:p>
+            <a:pPr lvl="1"/>
+            <a:r>
+              <a:rPr lang="en-US" dirty="0"/>
+              <a:t>Comfortable implementing a graph</a:t>
+            </a:r>
+          </a:p>
+          <a:p>
+            <a:pPr lvl="2"/>
+            <a:r>
+              <a:rPr lang="en-US" dirty="0"/>
+              <a:t>Adj. List or Adj. Matrix</a:t>
+            </a:r>
+          </a:p>
+          <a:p>
+            <a:pPr lvl="1"/>
+            <a:r>
+              <a:rPr lang="en-US" dirty="0"/>
+              <a:t>If you aren’t comfortable with graphs, review them NOW!</a:t>
+            </a:r>
+          </a:p>
+          <a:p>
+            <a:pPr lvl="1"/>
+            <a:r>
+              <a:rPr lang="en-US" dirty="0"/>
+              <a:t>At some point, we will do a VERY short review of this</a:t>
+            </a:r>
+          </a:p>
+          <a:p>
             <a:endParaRPr lang="en-US" dirty="0"/>
           </a:p>
           <a:p>
             <a:r>
               <a:rPr lang="en-US" dirty="0"/>
-              <a:t>Artificial Intelligence: A Modern Approach</a:t>
+              <a:t>Basic Discrete Math Material</a:t>
             </a:r>
           </a:p>
           <a:p>
             <a:pPr lvl="1"/>
             <a:r>
               <a:rPr lang="en-US" dirty="0"/>
-              <a:t>Third Edition</a:t>
+              <a:t>Propositional Logic</a:t>
             </a:r>
           </a:p>
           <a:p>
             <a:pPr lvl="1"/>
             <a:r>
               <a:rPr lang="en-US" dirty="0"/>
-              <a:t>Stuart </a:t>
-            </a:r>
-            <a:r>
-              <a:rPr lang="en-US" dirty="0" err="1"/>
-              <a:t>Russel</a:t>
-            </a:r>
-            <a:r>
-              <a:rPr lang="en-US" dirty="0"/>
-              <a:t> &amp; Peter </a:t>
-            </a:r>
-            <a:r>
-              <a:rPr lang="en-US" dirty="0" err="1"/>
-              <a:t>Norvig</a:t>
-            </a:r>
-            <a:endParaRPr lang="en-US" dirty="0"/>
+              <a:t>Basic logic and inference</a:t>
+            </a:r>
           </a:p>
           <a:p>
             <a:pPr lvl="1"/>
             <a:endParaRPr lang="en-US" dirty="0"/>
           </a:p>
           <a:p>
-            <a:r>
-              <a:rPr lang="en-US" dirty="0"/>
-              <a:t>ISBN: 978-0136042594</a:t>
-            </a:r>
-          </a:p>
-          <a:p>
+            <a:pPr lvl="2"/>
             <a:endParaRPr lang="en-US" dirty="0"/>
-          </a:p>
-          <a:p>
-            <a:r>
-              <a:rPr lang="en-US" dirty="0"/>
-              <a:t>We will be following the book loosely</a:t>
-            </a:r>
-          </a:p>
-          <a:p>
-            <a:pPr lvl="1"/>
-            <a:r>
-              <a:rPr lang="en-US" dirty="0"/>
-              <a:t>So you can probably survive without it, but I recommend having it.</a:t>
-            </a:r>
           </a:p>
         </p:txBody>
       </p:sp>
       <p:pic>
         <p:nvPicPr>
-          <p:cNvPr id="4098" name="Picture 2" descr="http://imt.xmu.edu.cn/Rongrong%20Ji%20@%20XMU_files/ai.jpg"/>
+          <p:cNvPr id="2050" name="Picture 2" descr="http://www1.pcmag.com/media/images/347846-artificial-intelligence.jpg"/>
           <p:cNvPicPr>
             <a:picLocks noChangeAspect="1" noChangeArrowheads="1"/>
           </p:cNvPicPr>
@@ -7649,8 +7815,8 @@
         </p:blipFill>
         <p:spPr bwMode="auto">
           <a:xfrm>
-            <a:off x="1001149" y="414747"/>
-            <a:ext cx="4705350" cy="5943601"/>
+            <a:off x="349321" y="1456166"/>
+            <a:ext cx="5645442" cy="3178175"/>
           </a:xfrm>
           <a:prstGeom prst="rect">
             <a:avLst/>
@@ -7670,7 +7836,7 @@
     </p:spTree>
     <p:extLst>
       <p:ext uri="{BB962C8B-B14F-4D97-AF65-F5344CB8AC3E}">
-        <p14:creationId xmlns:p14="http://schemas.microsoft.com/office/powerpoint/2010/main" val="64238310"/>
+        <p14:creationId xmlns:p14="http://schemas.microsoft.com/office/powerpoint/2010/main" val="1503045457"/>
       </p:ext>
     </p:extLst>
   </p:cSld>
@@ -7714,9 +7880,7 @@
           </a:xfrm>
         </p:spPr>
         <p:txBody>
-          <a:bodyPr>
-            <a:normAutofit fontScale="92500" lnSpcReduction="10000"/>
-          </a:bodyPr>
+          <a:bodyPr/>
           <a:lstStyle/>
           <a:p>
             <a:pPr marL="36900" indent="0" algn="ctr">
@@ -7724,74 +7888,79 @@
             </a:pPr>
             <a:r>
               <a:rPr lang="en-US" sz="2400" b="1" dirty="0"/>
-              <a:t>Topics (As of right now)</a:t>
-            </a:r>
-          </a:p>
-          <a:p>
-            <a:r>
-              <a:rPr lang="en-US" dirty="0"/>
-              <a:t>Introduction to AI</a:t>
-            </a:r>
-          </a:p>
-          <a:p>
-            <a:r>
-              <a:rPr lang="en-US" dirty="0"/>
-              <a:t>Knowledge Representation</a:t>
-            </a:r>
-          </a:p>
-          <a:p>
-            <a:r>
-              <a:rPr lang="en-US" dirty="0"/>
-              <a:t>Expert Systems</a:t>
-            </a:r>
-          </a:p>
-          <a:p>
-            <a:r>
-              <a:rPr lang="en-US" dirty="0"/>
-              <a:t>Search</a:t>
-            </a:r>
-          </a:p>
-          <a:p>
-            <a:r>
-              <a:rPr lang="en-US" dirty="0"/>
-              <a:t>Reasoning Under Uncertainty</a:t>
-            </a:r>
-          </a:p>
-          <a:p>
-            <a:r>
-              <a:rPr lang="en-US" dirty="0"/>
-              <a:t>Multi-Agent Systems</a:t>
-            </a:r>
-          </a:p>
-          <a:p>
-            <a:r>
-              <a:rPr lang="en-US" dirty="0"/>
-              <a:t>Machine Learning</a:t>
-            </a:r>
-          </a:p>
-          <a:p>
+              <a:t>Textbook (Required)</a:t>
+            </a:r>
+          </a:p>
+          <a:p>
+            <a:pPr marL="450000" lvl="1" indent="0">
+              <a:buNone/>
+            </a:pPr>
             <a:endParaRPr lang="en-US" dirty="0"/>
           </a:p>
           <a:p>
             <a:r>
               <a:rPr lang="en-US" dirty="0"/>
-              <a:t>Course is meant to be an overview of AI, so won’t go completely into any one topic.</a:t>
-            </a:r>
-          </a:p>
-          <a:p>
+              <a:t>Artificial Intelligence: A Modern Approach</a:t>
+            </a:r>
+          </a:p>
+          <a:p>
+            <a:pPr lvl="1"/>
+            <a:r>
+              <a:rPr lang="en-US" dirty="0"/>
+              <a:t>Third Edition</a:t>
+            </a:r>
+          </a:p>
+          <a:p>
+            <a:pPr lvl="1"/>
+            <a:r>
+              <a:rPr lang="en-US" dirty="0"/>
+              <a:t>Stuart </a:t>
+            </a:r>
+            <a:r>
+              <a:rPr lang="en-US" dirty="0" err="1"/>
+              <a:t>Russel</a:t>
+            </a:r>
+            <a:r>
+              <a:rPr lang="en-US" dirty="0"/>
+              <a:t> &amp; Peter </a:t>
+            </a:r>
+            <a:r>
+              <a:rPr lang="en-US" dirty="0" err="1"/>
+              <a:t>Norvig</a:t>
+            </a:r>
             <a:endParaRPr lang="en-US" dirty="0"/>
           </a:p>
           <a:p>
-            <a:r>
-              <a:rPr lang="en-US" dirty="0"/>
-              <a:t>* Might add some natural language processing, computer vision, etc. if time allows.</a:t>
+            <a:pPr lvl="1"/>
+            <a:endParaRPr lang="en-US" dirty="0"/>
+          </a:p>
+          <a:p>
+            <a:r>
+              <a:rPr lang="en-US" dirty="0"/>
+              <a:t>ISBN: 978-0136042594</a:t>
+            </a:r>
+          </a:p>
+          <a:p>
+            <a:endParaRPr lang="en-US" dirty="0"/>
+          </a:p>
+          <a:p>
+            <a:r>
+              <a:rPr lang="en-US" dirty="0"/>
+              <a:t>We will be following the book loosely</a:t>
+            </a:r>
+          </a:p>
+          <a:p>
+            <a:pPr lvl="1"/>
+            <a:r>
+              <a:rPr lang="en-US" dirty="0"/>
+              <a:t>So you can probably survive without it, but I recommend having it.</a:t>
             </a:r>
           </a:p>
         </p:txBody>
       </p:sp>
       <p:pic>
         <p:nvPicPr>
-          <p:cNvPr id="4" name="Picture 2" descr="http://www1.pcmag.com/media/images/347846-artificial-intelligence.jpg"/>
+          <p:cNvPr id="4098" name="Picture 2" descr="http://imt.xmu.edu.cn/Rongrong%20Ji%20@%20XMU_files/ai.jpg"/>
           <p:cNvPicPr>
             <a:picLocks noChangeAspect="1" noChangeArrowheads="1"/>
           </p:cNvPicPr>
@@ -7812,8 +7981,8 @@
         </p:blipFill>
         <p:spPr bwMode="auto">
           <a:xfrm>
-            <a:off x="349321" y="1456166"/>
-            <a:ext cx="5645442" cy="3178175"/>
+            <a:off x="1001149" y="414747"/>
+            <a:ext cx="4705350" cy="5943601"/>
           </a:xfrm>
           <a:prstGeom prst="rect">
             <a:avLst/>
@@ -7833,7 +8002,7 @@
     </p:spTree>
     <p:extLst>
       <p:ext uri="{BB962C8B-B14F-4D97-AF65-F5344CB8AC3E}">
-        <p14:creationId xmlns:p14="http://schemas.microsoft.com/office/powerpoint/2010/main" val="1329318828"/>
+        <p14:creationId xmlns:p14="http://schemas.microsoft.com/office/powerpoint/2010/main" val="64238310"/>
       </p:ext>
     </p:extLst>
   </p:cSld>
@@ -7887,7 +8056,49 @@
             </a:pPr>
             <a:r>
               <a:rPr lang="en-US" sz="2400" b="1" dirty="0"/>
-              <a:t>Midterms</a:t>
+              <a:t>Topics (As of right now)</a:t>
+            </a:r>
+          </a:p>
+          <a:p>
+            <a:r>
+              <a:rPr lang="en-US" dirty="0"/>
+              <a:t>Introduction to AI</a:t>
+            </a:r>
+          </a:p>
+          <a:p>
+            <a:r>
+              <a:rPr lang="en-US" dirty="0"/>
+              <a:t>Knowledge Representation</a:t>
+            </a:r>
+          </a:p>
+          <a:p>
+            <a:r>
+              <a:rPr lang="en-US" dirty="0"/>
+              <a:t>Expert Systems</a:t>
+            </a:r>
+          </a:p>
+          <a:p>
+            <a:r>
+              <a:rPr lang="en-US" dirty="0"/>
+              <a:t>Search</a:t>
+            </a:r>
+          </a:p>
+          <a:p>
+            <a:r>
+              <a:rPr lang="en-US" dirty="0"/>
+              <a:t>Reasoning Under Uncertainty</a:t>
+            </a:r>
+          </a:p>
+          <a:p>
+            <a:r>
+              <a:rPr lang="en-US" dirty="0"/>
+              <a:t>Multi-Agent Systems</a:t>
+            </a:r>
+          </a:p>
+          <a:p>
+            <a:r>
+              <a:rPr lang="en-US" dirty="0"/>
+              <a:t>Machine Learning</a:t>
             </a:r>
           </a:p>
           <a:p>
@@ -7896,29 +8107,11 @@
           <a:p>
             <a:r>
               <a:rPr lang="en-US" dirty="0"/>
-              <a:t>Three midterms and one final:</a:t>
-            </a:r>
-          </a:p>
-          <a:p>
-            <a:pPr lvl="1"/>
-            <a:r>
-              <a:rPr lang="en-US" dirty="0"/>
-              <a:t>We will have a test every Friday</a:t>
-            </a:r>
-          </a:p>
-          <a:p>
-            <a:pPr lvl="1"/>
-            <a:r>
-              <a:rPr lang="en-US" dirty="0"/>
-              <a:t>First one is just an essay</a:t>
-            </a:r>
-          </a:p>
-          <a:p>
-            <a:pPr lvl="1"/>
-            <a:r>
-              <a:rPr lang="en-US" dirty="0"/>
-              <a:t>Other ones are traditional technical exams</a:t>
-            </a:r>
+              <a:t>Course is meant to be an overview of AI, so won’t go completely into any one topic.</a:t>
+            </a:r>
+          </a:p>
+          <a:p>
+            <a:endParaRPr lang="en-US" dirty="0"/>
           </a:p>
           <a:p>
             <a:pPr marL="36900" indent="0">
@@ -7926,27 +8119,11 @@
             </a:pPr>
             <a:endParaRPr lang="en-US" dirty="0"/>
           </a:p>
-          <a:p>
-            <a:r>
-              <a:rPr lang="en-US" dirty="0"/>
-              <a:t>Exams designed to take ~1.5 hours at most</a:t>
-            </a:r>
-          </a:p>
-          <a:p>
-            <a:pPr lvl="1"/>
-            <a:endParaRPr lang="en-US" dirty="0"/>
-          </a:p>
-          <a:p>
-            <a:pPr marL="36900" indent="0">
-              <a:buNone/>
-            </a:pPr>
-            <a:endParaRPr lang="en-US" dirty="0"/>
-          </a:p>
         </p:txBody>
       </p:sp>
       <p:pic>
         <p:nvPicPr>
-          <p:cNvPr id="5122" name="Picture 2" descr="http://actionbash.com/wp-content/uploads/2012/06/4454827_460s_v11.jpg"/>
+          <p:cNvPr id="4" name="Picture 2" descr="http://www1.pcmag.com/media/images/347846-artificial-intelligence.jpg"/>
           <p:cNvPicPr>
             <a:picLocks noChangeAspect="1" noChangeArrowheads="1"/>
           </p:cNvPicPr>
@@ -7967,8 +8144,8 @@
         </p:blipFill>
         <p:spPr bwMode="auto">
           <a:xfrm>
-            <a:off x="1168297" y="808894"/>
-            <a:ext cx="3924300" cy="5334001"/>
+            <a:off x="349321" y="1456166"/>
+            <a:ext cx="5645442" cy="3178175"/>
           </a:xfrm>
           <a:prstGeom prst="rect">
             <a:avLst/>
@@ -7988,7 +8165,7 @@
     </p:spTree>
     <p:extLst>
       <p:ext uri="{BB962C8B-B14F-4D97-AF65-F5344CB8AC3E}">
-        <p14:creationId xmlns:p14="http://schemas.microsoft.com/office/powerpoint/2010/main" val="4278944943"/>
+        <p14:creationId xmlns:p14="http://schemas.microsoft.com/office/powerpoint/2010/main" val="1329318828"/>
       </p:ext>
     </p:extLst>
   </p:cSld>
@@ -8033,7 +8210,7 @@
         </p:spPr>
         <p:txBody>
           <a:bodyPr>
-            <a:normAutofit lnSpcReduction="10000"/>
+            <a:normAutofit/>
           </a:bodyPr>
           <a:lstStyle/>
           <a:p>
@@ -8042,7 +8219,7 @@
             </a:pPr>
             <a:r>
               <a:rPr lang="en-US" sz="2400" b="1" dirty="0"/>
-              <a:t>Homework: The Meat of the Course</a:t>
+              <a:t>Modules</a:t>
             </a:r>
           </a:p>
           <a:p>
@@ -8051,64 +8228,92 @@
           <a:p>
             <a:r>
               <a:rPr lang="en-US" dirty="0"/>
-              <a:t>5 of these (small chance we remove or add one, but most likely 5)</a:t>
-            </a:r>
-          </a:p>
-          <a:p>
-            <a:r>
-              <a:rPr lang="en-US" dirty="0"/>
-              <a:t>50% of your grade</a:t>
+              <a:t>Course is split into 9 modules</a:t>
             </a:r>
           </a:p>
           <a:p>
             <a:endParaRPr lang="en-US" dirty="0"/>
           </a:p>
           <a:p>
-            <a:r>
-              <a:rPr lang="en-US" dirty="0"/>
-              <a:t>Programming problems</a:t>
-            </a:r>
-          </a:p>
-          <a:p>
-            <a:r>
-              <a:rPr lang="en-US" dirty="0"/>
-              <a:t>Problems will be well-defined, but many solutions possible</a:t>
-            </a:r>
-          </a:p>
-          <a:p>
+            <a:pPr lvl="1"/>
+            <a:r>
+              <a:rPr lang="en-US" dirty="0"/>
+              <a:t>What is AI?</a:t>
+            </a:r>
+          </a:p>
+          <a:p>
+            <a:pPr lvl="1"/>
+            <a:r>
+              <a:rPr lang="en-US" dirty="0"/>
+              <a:t>Expert Systems</a:t>
+            </a:r>
+          </a:p>
+          <a:p>
+            <a:pPr lvl="1"/>
+            <a:r>
+              <a:rPr lang="en-US" dirty="0"/>
+              <a:t>Classic Search</a:t>
+            </a:r>
+          </a:p>
+          <a:p>
+            <a:pPr lvl="1"/>
+            <a:r>
+              <a:rPr lang="en-US" dirty="0"/>
+              <a:t>Local Search</a:t>
+            </a:r>
+          </a:p>
+          <a:p>
+            <a:pPr lvl="1"/>
+            <a:r>
+              <a:rPr lang="en-US" dirty="0"/>
+              <a:t>Game Playing</a:t>
+            </a:r>
+          </a:p>
+          <a:p>
+            <a:pPr lvl="1"/>
+            <a:r>
+              <a:rPr lang="en-US" dirty="0"/>
+              <a:t>Bayesian Networks</a:t>
+            </a:r>
+          </a:p>
+          <a:p>
+            <a:pPr lvl="1"/>
+            <a:r>
+              <a:rPr lang="en-US" dirty="0"/>
+              <a:t>Markov Models</a:t>
+            </a:r>
+          </a:p>
+          <a:p>
+            <a:pPr lvl="1"/>
+            <a:r>
+              <a:rPr lang="en-US" dirty="0"/>
+              <a:t>Multi-agent systems</a:t>
+            </a:r>
+          </a:p>
+          <a:p>
+            <a:pPr lvl="1"/>
+            <a:r>
+              <a:rPr lang="en-US" dirty="0"/>
+              <a:t>Machine Learning</a:t>
+            </a:r>
+          </a:p>
+          <a:p>
+            <a:pPr marL="36900" indent="0">
+              <a:buNone/>
+            </a:pPr>
             <a:endParaRPr lang="en-US" dirty="0"/>
-          </a:p>
-          <a:p>
-            <a:r>
-              <a:rPr lang="en-US" dirty="0"/>
-              <a:t>For each you will:</a:t>
-            </a:r>
-          </a:p>
-          <a:p>
-            <a:pPr lvl="1"/>
-            <a:r>
-              <a:rPr lang="en-US" dirty="0"/>
-              <a:t>Turn in your code</a:t>
-            </a:r>
-          </a:p>
-          <a:p>
-            <a:pPr lvl="1"/>
-            <a:r>
-              <a:rPr lang="en-US" dirty="0"/>
-              <a:t>Usually some kind of write-up regarding your solution</a:t>
-            </a:r>
           </a:p>
         </p:txBody>
       </p:sp>
       <p:pic>
         <p:nvPicPr>
-          <p:cNvPr id="7170" name="Picture 2" descr="http://www.dumpaday.com/wp-content/uploads/2013/01/doing-your-homework-funny-quotes.jpg"/>
+          <p:cNvPr id="5122" name="Picture 2" descr="http://actionbash.com/wp-content/uploads/2012/06/4454827_460s_v11.jpg"/>
           <p:cNvPicPr>
             <a:picLocks noChangeAspect="1" noChangeArrowheads="1"/>
           </p:cNvPicPr>
           <p:nvPr/>
         </p:nvPicPr>
-        <p:blipFill rotWithShape="1">
+        <p:blipFill>
           <a:blip r:embed="rId2">
             <a:extLst>
               <a:ext uri="{28A0092B-C50C-407E-A947-70E740481C1C}">
@@ -8116,13 +8321,15 @@
               </a:ext>
             </a:extLst>
           </a:blip>
-          <a:srcRect l="-919" t="9604" r="275" b="5236"/>
-          <a:stretch/>
+          <a:srcRect/>
+          <a:stretch>
+            <a:fillRect/>
+          </a:stretch>
         </p:blipFill>
         <p:spPr bwMode="auto">
           <a:xfrm>
-            <a:off x="91440" y="1648872"/>
-            <a:ext cx="5943600" cy="4023360"/>
+            <a:off x="1168297" y="808894"/>
+            <a:ext cx="3924300" cy="5334001"/>
           </a:xfrm>
           <a:prstGeom prst="rect">
             <a:avLst/>
@@ -8142,7 +8349,7 @@
     </p:spTree>
     <p:extLst>
       <p:ext uri="{BB962C8B-B14F-4D97-AF65-F5344CB8AC3E}">
-        <p14:creationId xmlns:p14="http://schemas.microsoft.com/office/powerpoint/2010/main" val="3537748648"/>
+        <p14:creationId xmlns:p14="http://schemas.microsoft.com/office/powerpoint/2010/main" val="4278944943"/>
       </p:ext>
     </p:extLst>
   </p:cSld>
@@ -8196,7 +8403,25 @@
             </a:pPr>
             <a:r>
               <a:rPr lang="en-US" sz="2400" b="1" dirty="0"/>
-              <a:t>Homework: The Meat of the Course</a:t>
+              <a:t>Quizzes</a:t>
+            </a:r>
+          </a:p>
+          <a:p>
+            <a:r>
+              <a:rPr lang="en-US" dirty="0"/>
+              <a:t>Some modules have a quiz</a:t>
+            </a:r>
+          </a:p>
+          <a:p>
+            <a:r>
+              <a:rPr lang="en-US" dirty="0"/>
+              <a:t>Some modules have homework</a:t>
+            </a:r>
+          </a:p>
+          <a:p>
+            <a:r>
+              <a:rPr lang="en-US" dirty="0"/>
+              <a:t>A couple have both.</a:t>
             </a:r>
           </a:p>
           <a:p>
@@ -8205,80 +8430,35 @@
           <a:p>
             <a:r>
               <a:rPr lang="en-US" dirty="0"/>
-              <a:t>Recommendations:</a:t>
-            </a:r>
-          </a:p>
-          <a:p>
-            <a:pPr lvl="1"/>
-            <a:r>
-              <a:rPr lang="en-US" dirty="0"/>
-              <a:t>Start Early!! These HWs generally are not of the “just implement something” form.</a:t>
-            </a:r>
-          </a:p>
-          <a:p>
-            <a:pPr lvl="1"/>
-            <a:r>
-              <a:rPr lang="en-US" dirty="0"/>
-              <a:t>You will need to:</a:t>
-            </a:r>
-          </a:p>
-          <a:p>
-            <a:pPr lvl="2"/>
-            <a:r>
-              <a:rPr lang="en-US" dirty="0"/>
-              <a:t>Implement an algorithm</a:t>
-            </a:r>
-          </a:p>
-          <a:p>
-            <a:pPr lvl="2"/>
-            <a:r>
-              <a:rPr lang="en-US" dirty="0"/>
-              <a:t>Test it, see where it does well and fails</a:t>
-            </a:r>
-          </a:p>
-          <a:p>
-            <a:pPr lvl="2"/>
-            <a:r>
-              <a:rPr lang="en-US" dirty="0"/>
-              <a:t>Tweak it and see how performance changes</a:t>
-            </a:r>
-          </a:p>
-          <a:p>
-            <a:pPr lvl="2"/>
-            <a:r>
-              <a:rPr lang="en-US" dirty="0"/>
-              <a:t>Test on MANY different types of inputs</a:t>
-            </a:r>
-          </a:p>
-          <a:p>
-            <a:pPr lvl="2"/>
-            <a:r>
-              <a:rPr lang="en-US" dirty="0"/>
-              <a:t>Analyze the differences</a:t>
-            </a:r>
-          </a:p>
-          <a:p>
-            <a:pPr lvl="2"/>
-            <a:r>
-              <a:rPr lang="en-US" dirty="0"/>
-              <a:t>Write an analytical paper about it</a:t>
-            </a:r>
-          </a:p>
-          <a:p>
-            <a:pPr lvl="1"/>
+              <a:t>5 quizzes total, these are 24 hour take home problems on associated module</a:t>
+            </a:r>
+          </a:p>
+          <a:p>
+            <a:endParaRPr lang="en-US" dirty="0"/>
+          </a:p>
+          <a:p>
+            <a:r>
+              <a:rPr lang="en-US" dirty="0"/>
+              <a:t>We will look at the schedule in a moment</a:t>
+            </a:r>
+          </a:p>
+          <a:p>
+            <a:pPr marL="36900" indent="0">
+              <a:buNone/>
+            </a:pPr>
             <a:endParaRPr lang="en-US" dirty="0"/>
           </a:p>
         </p:txBody>
       </p:sp>
       <p:pic>
         <p:nvPicPr>
-          <p:cNvPr id="7170" name="Picture 2" descr="http://www.dumpaday.com/wp-content/uploads/2013/01/doing-your-homework-funny-quotes.jpg"/>
+          <p:cNvPr id="5122" name="Picture 2" descr="http://actionbash.com/wp-content/uploads/2012/06/4454827_460s_v11.jpg"/>
           <p:cNvPicPr>
             <a:picLocks noChangeAspect="1" noChangeArrowheads="1"/>
           </p:cNvPicPr>
           <p:nvPr/>
         </p:nvPicPr>
-        <p:blipFill rotWithShape="1">
+        <p:blipFill>
           <a:blip r:embed="rId2">
             <a:extLst>
               <a:ext uri="{28A0092B-C50C-407E-A947-70E740481C1C}">
@@ -8286,13 +8466,15 @@
               </a:ext>
             </a:extLst>
           </a:blip>
-          <a:srcRect l="-919" t="9604" r="275" b="5236"/>
-          <a:stretch/>
+          <a:srcRect/>
+          <a:stretch>
+            <a:fillRect/>
+          </a:stretch>
         </p:blipFill>
         <p:spPr bwMode="auto">
           <a:xfrm>
-            <a:off x="91440" y="1648872"/>
-            <a:ext cx="5943600" cy="4023360"/>
+            <a:off x="1168297" y="808894"/>
+            <a:ext cx="3924300" cy="5334001"/>
           </a:xfrm>
           <a:prstGeom prst="rect">
             <a:avLst/>
@@ -8312,7 +8494,7 @@
     </p:spTree>
     <p:extLst>
       <p:ext uri="{BB962C8B-B14F-4D97-AF65-F5344CB8AC3E}">
-        <p14:creationId xmlns:p14="http://schemas.microsoft.com/office/powerpoint/2010/main" val="4281366638"/>
+        <p14:creationId xmlns:p14="http://schemas.microsoft.com/office/powerpoint/2010/main" val="1887537461"/>
       </p:ext>
     </p:extLst>
   </p:cSld>

</xml_diff>

<commit_message>
adding OH to main page
</commit_message>
<xml_diff>
--- a/slides/01-CourseIntroduction.pptx
+++ b/slides/01-CourseIntroduction.pptx
@@ -9,8 +9,8 @@
     <p:sldId id="257" r:id="rId3"/>
     <p:sldId id="273" r:id="rId4"/>
     <p:sldId id="258" r:id="rId5"/>
-    <p:sldId id="259" r:id="rId6"/>
-    <p:sldId id="260" r:id="rId7"/>
+    <p:sldId id="275" r:id="rId6"/>
+    <p:sldId id="259" r:id="rId7"/>
     <p:sldId id="261" r:id="rId8"/>
     <p:sldId id="262" r:id="rId9"/>
     <p:sldId id="274" r:id="rId10"/>
@@ -312,7 +312,7 @@
           <a:p>
             <a:fld id="{EE6CD189-E039-4A51-BC88-4927E4923AA0}" type="datetimeFigureOut">
               <a:rPr lang="en-US" smtClean="0"/>
-              <a:t>1/29/21</a:t>
+              <a:t>2/2/21</a:t>
             </a:fld>
             <a:endParaRPr lang="en-US"/>
           </a:p>
@@ -610,7 +610,7 @@
           <a:p>
             <a:fld id="{EE6CD189-E039-4A51-BC88-4927E4923AA0}" type="datetimeFigureOut">
               <a:rPr lang="en-US" smtClean="0"/>
-              <a:t>1/29/21</a:t>
+              <a:t>2/2/21</a:t>
             </a:fld>
             <a:endParaRPr lang="en-US"/>
           </a:p>
@@ -802,7 +802,7 @@
           <a:p>
             <a:fld id="{EE6CD189-E039-4A51-BC88-4927E4923AA0}" type="datetimeFigureOut">
               <a:rPr lang="en-US" smtClean="0"/>
-              <a:t>1/29/21</a:t>
+              <a:t>2/2/21</a:t>
             </a:fld>
             <a:endParaRPr lang="en-US"/>
           </a:p>
@@ -1063,7 +1063,7 @@
           <a:p>
             <a:fld id="{EE6CD189-E039-4A51-BC88-4927E4923AA0}" type="datetimeFigureOut">
               <a:rPr lang="en-US" smtClean="0"/>
-              <a:t>1/29/21</a:t>
+              <a:t>2/2/21</a:t>
             </a:fld>
             <a:endParaRPr lang="en-US"/>
           </a:p>
@@ -1487,7 +1487,7 @@
           <a:p>
             <a:fld id="{EE6CD189-E039-4A51-BC88-4927E4923AA0}" type="datetimeFigureOut">
               <a:rPr lang="en-US" smtClean="0"/>
-              <a:t>1/29/21</a:t>
+              <a:t>2/2/21</a:t>
             </a:fld>
             <a:endParaRPr lang="en-US"/>
           </a:p>
@@ -2024,7 +2024,7 @@
           <a:p>
             <a:fld id="{EE6CD189-E039-4A51-BC88-4927E4923AA0}" type="datetimeFigureOut">
               <a:rPr lang="en-US" smtClean="0"/>
-              <a:t>1/29/21</a:t>
+              <a:t>2/2/21</a:t>
             </a:fld>
             <a:endParaRPr lang="en-US"/>
           </a:p>
@@ -2888,7 +2888,7 @@
           <a:p>
             <a:fld id="{EE6CD189-E039-4A51-BC88-4927E4923AA0}" type="datetimeFigureOut">
               <a:rPr lang="en-US" smtClean="0"/>
-              <a:t>1/29/21</a:t>
+              <a:t>2/2/21</a:t>
             </a:fld>
             <a:endParaRPr lang="en-US"/>
           </a:p>
@@ -3058,7 +3058,7 @@
           <a:p>
             <a:fld id="{EE6CD189-E039-4A51-BC88-4927E4923AA0}" type="datetimeFigureOut">
               <a:rPr lang="en-US" smtClean="0"/>
-              <a:t>1/29/21</a:t>
+              <a:t>2/2/21</a:t>
             </a:fld>
             <a:endParaRPr lang="en-US"/>
           </a:p>
@@ -3242,7 +3242,7 @@
           <a:p>
             <a:fld id="{EE6CD189-E039-4A51-BC88-4927E4923AA0}" type="datetimeFigureOut">
               <a:rPr lang="en-US" smtClean="0"/>
-              <a:t>1/29/21</a:t>
+              <a:t>2/2/21</a:t>
             </a:fld>
             <a:endParaRPr lang="en-US"/>
           </a:p>
@@ -3412,7 +3412,7 @@
           <a:p>
             <a:fld id="{EE6CD189-E039-4A51-BC88-4927E4923AA0}" type="datetimeFigureOut">
               <a:rPr lang="en-US" smtClean="0"/>
-              <a:t>1/29/21</a:t>
+              <a:t>2/2/21</a:t>
             </a:fld>
             <a:endParaRPr lang="en-US"/>
           </a:p>
@@ -3656,7 +3656,7 @@
           <a:p>
             <a:fld id="{EE6CD189-E039-4A51-BC88-4927E4923AA0}" type="datetimeFigureOut">
               <a:rPr lang="en-US" smtClean="0"/>
-              <a:t>1/29/21</a:t>
+              <a:t>2/2/21</a:t>
             </a:fld>
             <a:endParaRPr lang="en-US"/>
           </a:p>
@@ -3892,7 +3892,7 @@
           <a:p>
             <a:fld id="{EE6CD189-E039-4A51-BC88-4927E4923AA0}" type="datetimeFigureOut">
               <a:rPr lang="en-US" smtClean="0"/>
-              <a:t>1/29/21</a:t>
+              <a:t>2/2/21</a:t>
             </a:fld>
             <a:endParaRPr lang="en-US"/>
           </a:p>
@@ -4358,7 +4358,7 @@
           <a:p>
             <a:fld id="{EE6CD189-E039-4A51-BC88-4927E4923AA0}" type="datetimeFigureOut">
               <a:rPr lang="en-US" smtClean="0"/>
-              <a:t>1/29/21</a:t>
+              <a:t>2/2/21</a:t>
             </a:fld>
             <a:endParaRPr lang="en-US"/>
           </a:p>
@@ -4476,7 +4476,7 @@
           <a:p>
             <a:fld id="{EE6CD189-E039-4A51-BC88-4927E4923AA0}" type="datetimeFigureOut">
               <a:rPr lang="en-US" smtClean="0"/>
-              <a:t>1/29/21</a:t>
+              <a:t>2/2/21</a:t>
             </a:fld>
             <a:endParaRPr lang="en-US"/>
           </a:p>
@@ -4571,7 +4571,7 @@
           <a:p>
             <a:fld id="{EE6CD189-E039-4A51-BC88-4927E4923AA0}" type="datetimeFigureOut">
               <a:rPr lang="en-US" smtClean="0"/>
-              <a:t>1/29/21</a:t>
+              <a:t>2/2/21</a:t>
             </a:fld>
             <a:endParaRPr lang="en-US"/>
           </a:p>
@@ -4826,7 +4826,7 @@
           <a:p>
             <a:fld id="{EE6CD189-E039-4A51-BC88-4927E4923AA0}" type="datetimeFigureOut">
               <a:rPr lang="en-US" smtClean="0"/>
-              <a:t>1/29/21</a:t>
+              <a:t>2/2/21</a:t>
             </a:fld>
             <a:endParaRPr lang="en-US"/>
           </a:p>
@@ -5126,7 +5126,7 @@
           <a:p>
             <a:fld id="{EE6CD189-E039-4A51-BC88-4927E4923AA0}" type="datetimeFigureOut">
               <a:rPr lang="en-US" smtClean="0"/>
-              <a:t>1/29/21</a:t>
+              <a:t>2/2/21</a:t>
             </a:fld>
             <a:endParaRPr lang="en-US"/>
           </a:p>
@@ -5360,7 +5360,7 @@
           <a:p>
             <a:fld id="{EE6CD189-E039-4A51-BC88-4927E4923AA0}" type="datetimeFigureOut">
               <a:rPr lang="en-US" smtClean="0"/>
-              <a:t>1/29/21</a:t>
+              <a:t>2/2/21</a:t>
             </a:fld>
             <a:endParaRPr lang="en-US"/>
           </a:p>
@@ -7545,7 +7545,7 @@
             </a:pPr>
             <a:r>
               <a:rPr lang="en-US" sz="2400" b="1" dirty="0"/>
-              <a:t>Pre-requisites</a:t>
+              <a:t>Discord</a:t>
             </a:r>
           </a:p>
           <a:p>
@@ -7554,74 +7554,19 @@
           <a:p>
             <a:r>
               <a:rPr lang="en-US" dirty="0"/>
-              <a:t>Absolutely Required:</a:t>
-            </a:r>
-          </a:p>
-          <a:p>
-            <a:pPr lvl="1"/>
-            <a:r>
-              <a:rPr lang="en-US" dirty="0"/>
-              <a:t>CS2150 (</a:t>
-            </a:r>
-            <a:r>
-              <a:rPr lang="en-US" dirty="0" err="1"/>
-              <a:t>Prog</a:t>
-            </a:r>
-            <a:r>
-              <a:rPr lang="en-US" dirty="0"/>
-              <a:t>. and Data Rep.)</a:t>
-            </a:r>
-          </a:p>
-          <a:p>
-            <a:pPr lvl="1"/>
-            <a:r>
-              <a:rPr lang="en-US" dirty="0"/>
-              <a:t>CS2102 (Discrete Math)</a:t>
-            </a:r>
-          </a:p>
-          <a:p>
-            <a:pPr lvl="1"/>
-            <a:endParaRPr lang="en-US" dirty="0"/>
-          </a:p>
-          <a:p>
-            <a:r>
-              <a:rPr lang="en-US" dirty="0"/>
-              <a:t>Helpful, but not (technically) required:</a:t>
-            </a:r>
-          </a:p>
-          <a:p>
-            <a:pPr lvl="1"/>
-            <a:r>
-              <a:rPr lang="en-US" dirty="0"/>
-              <a:t>CS4102 (Algorithms)</a:t>
-            </a:r>
-          </a:p>
-          <a:p>
-            <a:pPr lvl="1"/>
-            <a:r>
-              <a:rPr lang="en-US" dirty="0"/>
-              <a:t>Probability</a:t>
-            </a:r>
-          </a:p>
-          <a:p>
-            <a:pPr lvl="2"/>
-            <a:r>
-              <a:rPr lang="en-US" dirty="0"/>
-              <a:t>We’ll review some of this when necessary</a:t>
-            </a:r>
-          </a:p>
-          <a:p>
-            <a:pPr lvl="1"/>
-            <a:r>
-              <a:rPr lang="en-US" dirty="0"/>
-              <a:t>Statistics</a:t>
-            </a:r>
-          </a:p>
-          <a:p>
-            <a:pPr lvl="2"/>
-            <a:r>
-              <a:rPr lang="en-US" dirty="0"/>
-              <a:t>Not much, but a little stat is helpful</a:t>
+              <a:t>Please join the class discord!</a:t>
+            </a:r>
+          </a:p>
+          <a:p>
+            <a:r>
+              <a:rPr lang="en-US" dirty="0"/>
+              <a:t>I’ll put the link in the chat.</a:t>
+            </a:r>
+          </a:p>
+          <a:p>
+            <a:r>
+              <a:rPr lang="en-US" dirty="0"/>
+              <a:t>MOST of our course communication will happen there.</a:t>
             </a:r>
           </a:p>
         </p:txBody>
@@ -7722,64 +7667,38 @@
             </a:pPr>
             <a:r>
               <a:rPr lang="en-US" sz="2400" b="1" dirty="0"/>
-              <a:t>I Expect You to Know</a:t>
-            </a:r>
-          </a:p>
-          <a:p>
-            <a:r>
-              <a:rPr lang="en-US" dirty="0"/>
-              <a:t>Graphs</a:t>
+              <a:t>Pre-requisites</a:t>
+            </a:r>
+          </a:p>
+          <a:p>
+            <a:endParaRPr lang="en-US" dirty="0"/>
+          </a:p>
+          <a:p>
+            <a:r>
+              <a:rPr lang="en-US" dirty="0"/>
+              <a:t>Absolutely Required:</a:t>
             </a:r>
           </a:p>
           <a:p>
             <a:pPr lvl="1"/>
             <a:r>
               <a:rPr lang="en-US" dirty="0"/>
-              <a:t>Comfortable implementing a graph</a:t>
-            </a:r>
-          </a:p>
-          <a:p>
-            <a:pPr lvl="2"/>
-            <a:r>
-              <a:rPr lang="en-US" dirty="0"/>
-              <a:t>Adj. List or Adj. Matrix</a:t>
+              <a:t>CS2150 (</a:t>
+            </a:r>
+            <a:r>
+              <a:rPr lang="en-US" dirty="0" err="1"/>
+              <a:t>Prog</a:t>
+            </a:r>
+            <a:r>
+              <a:rPr lang="en-US" dirty="0"/>
+              <a:t>. and Data Rep.)</a:t>
             </a:r>
           </a:p>
           <a:p>
             <a:pPr lvl="1"/>
             <a:r>
               <a:rPr lang="en-US" dirty="0"/>
-              <a:t>If you aren’t comfortable with graphs, review them NOW!</a:t>
-            </a:r>
-          </a:p>
-          <a:p>
-            <a:pPr lvl="1"/>
-            <a:r>
-              <a:rPr lang="en-US" dirty="0"/>
-              <a:t>At some point, we will do a VERY short review of this</a:t>
-            </a:r>
-          </a:p>
-          <a:p>
-            <a:endParaRPr lang="en-US" dirty="0"/>
-          </a:p>
-          <a:p>
-            <a:r>
-              <a:rPr lang="en-US" dirty="0"/>
-              <a:t>Basic Discrete Math Material</a:t>
-            </a:r>
-          </a:p>
-          <a:p>
-            <a:pPr lvl="1"/>
-            <a:r>
-              <a:rPr lang="en-US" dirty="0"/>
-              <a:t>Propositional Logic</a:t>
-            </a:r>
-          </a:p>
-          <a:p>
-            <a:pPr lvl="1"/>
-            <a:r>
-              <a:rPr lang="en-US" dirty="0"/>
-              <a:t>Basic logic and inference</a:t>
+              <a:t>CS2102 (Discrete Math)</a:t>
             </a:r>
           </a:p>
           <a:p>
@@ -7787,14 +7706,51 @@
             <a:endParaRPr lang="en-US" dirty="0"/>
           </a:p>
           <a:p>
+            <a:r>
+              <a:rPr lang="en-US" dirty="0"/>
+              <a:t>Helpful, but not (technically) required:</a:t>
+            </a:r>
+          </a:p>
+          <a:p>
+            <a:pPr lvl="1"/>
+            <a:r>
+              <a:rPr lang="en-US" dirty="0"/>
+              <a:t>CS4102 (Algorithms)</a:t>
+            </a:r>
+          </a:p>
+          <a:p>
+            <a:pPr lvl="1"/>
+            <a:r>
+              <a:rPr lang="en-US" dirty="0"/>
+              <a:t>Probability</a:t>
+            </a:r>
+          </a:p>
+          <a:p>
             <a:pPr lvl="2"/>
-            <a:endParaRPr lang="en-US" dirty="0"/>
+            <a:r>
+              <a:rPr lang="en-US" dirty="0"/>
+              <a:t>We’ll review some of this when necessary</a:t>
+            </a:r>
+          </a:p>
+          <a:p>
+            <a:pPr lvl="1"/>
+            <a:r>
+              <a:rPr lang="en-US" dirty="0"/>
+              <a:t>Statistics</a:t>
+            </a:r>
+          </a:p>
+          <a:p>
+            <a:pPr lvl="2"/>
+            <a:r>
+              <a:rPr lang="en-US" dirty="0"/>
+              <a:t>Not much, but a little stat is helpful</a:t>
+            </a:r>
           </a:p>
         </p:txBody>
       </p:sp>
       <p:pic>
         <p:nvPicPr>
-          <p:cNvPr id="2050" name="Picture 2" descr="http://www1.pcmag.com/media/images/347846-artificial-intelligence.jpg"/>
+          <p:cNvPr id="1026" name="Picture 2" descr="https://sp.yimg.com/ib/th?id=HN.608005616744729845&amp;pid=15.1&amp;P=0"/>
           <p:cNvPicPr>
             <a:picLocks noChangeAspect="1" noChangeArrowheads="1"/>
           </p:cNvPicPr>
@@ -7815,8 +7771,8 @@
         </p:blipFill>
         <p:spPr bwMode="auto">
           <a:xfrm>
-            <a:off x="349321" y="1456166"/>
-            <a:ext cx="5645442" cy="3178175"/>
+            <a:off x="647943" y="808894"/>
+            <a:ext cx="4898781" cy="4898781"/>
           </a:xfrm>
           <a:prstGeom prst="rect">
             <a:avLst/>
@@ -7836,7 +7792,7 @@
     </p:spTree>
     <p:extLst>
       <p:ext uri="{BB962C8B-B14F-4D97-AF65-F5344CB8AC3E}">
-        <p14:creationId xmlns:p14="http://schemas.microsoft.com/office/powerpoint/2010/main" val="1503045457"/>
+        <p14:creationId xmlns:p14="http://schemas.microsoft.com/office/powerpoint/2010/main" val="154220897"/>
       </p:ext>
     </p:extLst>
   </p:cSld>
@@ -7888,79 +7844,79 @@
             </a:pPr>
             <a:r>
               <a:rPr lang="en-US" sz="2400" b="1" dirty="0"/>
-              <a:t>Textbook (Required)</a:t>
-            </a:r>
-          </a:p>
-          <a:p>
-            <a:pPr marL="450000" lvl="1" indent="0">
-              <a:buNone/>
-            </a:pPr>
+              <a:t>I Expect You to Know</a:t>
+            </a:r>
+          </a:p>
+          <a:p>
+            <a:r>
+              <a:rPr lang="en-US" dirty="0"/>
+              <a:t>Graphs</a:t>
+            </a:r>
+          </a:p>
+          <a:p>
+            <a:pPr lvl="1"/>
+            <a:r>
+              <a:rPr lang="en-US" dirty="0"/>
+              <a:t>Comfortable implementing a graph</a:t>
+            </a:r>
+          </a:p>
+          <a:p>
+            <a:pPr lvl="2"/>
+            <a:r>
+              <a:rPr lang="en-US" dirty="0"/>
+              <a:t>Adj. List or Adj. Matrix</a:t>
+            </a:r>
+          </a:p>
+          <a:p>
+            <a:pPr lvl="1"/>
+            <a:r>
+              <a:rPr lang="en-US" dirty="0"/>
+              <a:t>If you aren’t comfortable with graphs, review them NOW!</a:t>
+            </a:r>
+          </a:p>
+          <a:p>
+            <a:pPr lvl="1"/>
+            <a:r>
+              <a:rPr lang="en-US" dirty="0"/>
+              <a:t>At some point, we will do a VERY short review of this</a:t>
+            </a:r>
+          </a:p>
+          <a:p>
             <a:endParaRPr lang="en-US" dirty="0"/>
           </a:p>
           <a:p>
             <a:r>
               <a:rPr lang="en-US" dirty="0"/>
-              <a:t>Artificial Intelligence: A Modern Approach</a:t>
+              <a:t>Basic Discrete Math Material</a:t>
             </a:r>
           </a:p>
           <a:p>
             <a:pPr lvl="1"/>
             <a:r>
               <a:rPr lang="en-US" dirty="0"/>
-              <a:t>Third Edition</a:t>
+              <a:t>Propositional Logic</a:t>
             </a:r>
           </a:p>
           <a:p>
             <a:pPr lvl="1"/>
             <a:r>
               <a:rPr lang="en-US" dirty="0"/>
-              <a:t>Stuart </a:t>
-            </a:r>
-            <a:r>
-              <a:rPr lang="en-US" dirty="0" err="1"/>
-              <a:t>Russel</a:t>
-            </a:r>
-            <a:r>
-              <a:rPr lang="en-US" dirty="0"/>
-              <a:t> &amp; Peter </a:t>
-            </a:r>
-            <a:r>
-              <a:rPr lang="en-US" dirty="0" err="1"/>
-              <a:t>Norvig</a:t>
-            </a:r>
-            <a:endParaRPr lang="en-US" dirty="0"/>
+              <a:t>Basic logic and inference</a:t>
+            </a:r>
           </a:p>
           <a:p>
             <a:pPr lvl="1"/>
             <a:endParaRPr lang="en-US" dirty="0"/>
           </a:p>
           <a:p>
-            <a:r>
-              <a:rPr lang="en-US" dirty="0"/>
-              <a:t>ISBN: 978-0136042594</a:t>
-            </a:r>
-          </a:p>
-          <a:p>
+            <a:pPr lvl="2"/>
             <a:endParaRPr lang="en-US" dirty="0"/>
-          </a:p>
-          <a:p>
-            <a:r>
-              <a:rPr lang="en-US" dirty="0"/>
-              <a:t>We will be following the book loosely</a:t>
-            </a:r>
-          </a:p>
-          <a:p>
-            <a:pPr lvl="1"/>
-            <a:r>
-              <a:rPr lang="en-US" dirty="0"/>
-              <a:t>So you can probably survive without it, but I recommend having it.</a:t>
-            </a:r>
           </a:p>
         </p:txBody>
       </p:sp>
       <p:pic>
         <p:nvPicPr>
-          <p:cNvPr id="4098" name="Picture 2" descr="http://imt.xmu.edu.cn/Rongrong%20Ji%20@%20XMU_files/ai.jpg"/>
+          <p:cNvPr id="2050" name="Picture 2" descr="http://www1.pcmag.com/media/images/347846-artificial-intelligence.jpg"/>
           <p:cNvPicPr>
             <a:picLocks noChangeAspect="1" noChangeArrowheads="1"/>
           </p:cNvPicPr>
@@ -7981,8 +7937,8 @@
         </p:blipFill>
         <p:spPr bwMode="auto">
           <a:xfrm>
-            <a:off x="1001149" y="414747"/>
-            <a:ext cx="4705350" cy="5943601"/>
+            <a:off x="349321" y="1456166"/>
+            <a:ext cx="5645442" cy="3178175"/>
           </a:xfrm>
           <a:prstGeom prst="rect">
             <a:avLst/>
@@ -8002,7 +7958,7 @@
     </p:spTree>
     <p:extLst>
       <p:ext uri="{BB962C8B-B14F-4D97-AF65-F5344CB8AC3E}">
-        <p14:creationId xmlns:p14="http://schemas.microsoft.com/office/powerpoint/2010/main" val="64238310"/>
+        <p14:creationId xmlns:p14="http://schemas.microsoft.com/office/powerpoint/2010/main" val="1503045457"/>
       </p:ext>
     </p:extLst>
   </p:cSld>

</xml_diff>